<commit_message>
Add UCT HPC logo to coverslide
</commit_message>
<xml_diff>
--- a/SAAB-AMA-SASSB-2019-talk/coverslide.pptx
+++ b/SAAB-AMA-SASSB-2019-talk/coverslide.pptx
@@ -8,7 +8,7 @@
     <p:sldId id="256" r:id="rId3"/>
   </p:sldIdLst>
   <p:sldSz cx="9144000" cy="6858000"/>
-  <p:notesSz cx="6858000" cy="9144000"/>
+  <p:notesSz cx="7559675" cy="10691812"/>
 </p:presentation>
 </file>
 
@@ -53,7 +53,7 @@
       </p:grpSpPr>
       <p:sp>
         <p:nvSpPr>
-          <p:cNvPr id="25" name="PlaceHolder 1"/>
+          <p:cNvPr id="23" name="PlaceHolder 1"/>
           <p:cNvSpPr>
             <a:spLocks noGrp="1"/>
           </p:cNvSpPr>
@@ -64,7 +64,7 @@
         <p:spPr>
           <a:xfrm>
             <a:off x="1143000" y="1122480"/>
-            <a:ext cx="6857640" cy="2387160"/>
+            <a:ext cx="6857280" cy="2386800"/>
           </a:xfrm>
           <a:prstGeom prst="rect">
             <a:avLst/>
@@ -73,18 +73,16 @@
         <p:txBody>
           <a:bodyPr lIns="0" rIns="0" tIns="0" bIns="0" anchor="ctr"/>
           <a:p>
-            <a:endParaRPr b="0" lang="en-GB" sz="1400" spc="-1" strike="noStrike">
-              <a:solidFill>
-                <a:srgbClr val="000000"/>
-              </a:solidFill>
-              <a:latin typeface="Arial"/>
-            </a:endParaRPr>
-          </a:p>
-        </p:txBody>
-      </p:sp>
-      <p:sp>
-        <p:nvSpPr>
-          <p:cNvPr id="26" name="PlaceHolder 2"/>
+            <a:pPr algn="ctr"/>
+            <a:endParaRPr b="0" lang="en-GB" sz="4400" spc="-1" strike="noStrike">
+              <a:latin typeface="Arial"/>
+            </a:endParaRPr>
+          </a:p>
+        </p:txBody>
+      </p:sp>
+      <p:sp>
+        <p:nvSpPr>
+          <p:cNvPr id="24" name="PlaceHolder 2"/>
           <p:cNvSpPr>
             <a:spLocks noGrp="1"/>
           </p:cNvSpPr>
@@ -106,18 +104,15 @@
             <a:normAutofit/>
           </a:bodyPr>
           <a:p>
-            <a:endParaRPr b="0" lang="en-GB" sz="1050" spc="-1" strike="noStrike">
-              <a:solidFill>
-                <a:srgbClr val="000000"/>
-              </a:solidFill>
-              <a:latin typeface="Arial"/>
-            </a:endParaRPr>
-          </a:p>
-        </p:txBody>
-      </p:sp>
-      <p:sp>
-        <p:nvSpPr>
-          <p:cNvPr id="27" name="PlaceHolder 3"/>
+            <a:endParaRPr b="0" lang="en-GB" sz="3200" spc="-1" strike="noStrike">
+              <a:latin typeface="Arial"/>
+            </a:endParaRPr>
+          </a:p>
+        </p:txBody>
+      </p:sp>
+      <p:sp>
+        <p:nvSpPr>
+          <p:cNvPr id="25" name="PlaceHolder 3"/>
           <p:cNvSpPr>
             <a:spLocks noGrp="1"/>
           </p:cNvSpPr>
@@ -139,10 +134,7 @@
             <a:normAutofit/>
           </a:bodyPr>
           <a:p>
-            <a:endParaRPr b="0" lang="en-GB" sz="1050" spc="-1" strike="noStrike">
-              <a:solidFill>
-                <a:srgbClr val="000000"/>
-              </a:solidFill>
+            <a:endParaRPr b="0" lang="en-GB" sz="3200" spc="-1" strike="noStrike">
               <a:latin typeface="Arial"/>
             </a:endParaRPr>
           </a:p>
@@ -172,7 +164,7 @@
       </p:grpSpPr>
       <p:sp>
         <p:nvSpPr>
-          <p:cNvPr id="28" name="PlaceHolder 1"/>
+          <p:cNvPr id="26" name="PlaceHolder 1"/>
           <p:cNvSpPr>
             <a:spLocks noGrp="1"/>
           </p:cNvSpPr>
@@ -183,7 +175,7 @@
         <p:spPr>
           <a:xfrm>
             <a:off x="1143000" y="1122480"/>
-            <a:ext cx="6857640" cy="2387160"/>
+            <a:ext cx="6857280" cy="2386800"/>
           </a:xfrm>
           <a:prstGeom prst="rect">
             <a:avLst/>
@@ -192,18 +184,16 @@
         <p:txBody>
           <a:bodyPr lIns="0" rIns="0" tIns="0" bIns="0" anchor="ctr"/>
           <a:p>
-            <a:endParaRPr b="0" lang="en-GB" sz="1400" spc="-1" strike="noStrike">
-              <a:solidFill>
-                <a:srgbClr val="000000"/>
-              </a:solidFill>
-              <a:latin typeface="Arial"/>
-            </a:endParaRPr>
-          </a:p>
-        </p:txBody>
-      </p:sp>
-      <p:sp>
-        <p:nvSpPr>
-          <p:cNvPr id="29" name="PlaceHolder 2"/>
+            <a:pPr algn="ctr"/>
+            <a:endParaRPr b="0" lang="en-GB" sz="4400" spc="-1" strike="noStrike">
+              <a:latin typeface="Arial"/>
+            </a:endParaRPr>
+          </a:p>
+        </p:txBody>
+      </p:sp>
+      <p:sp>
+        <p:nvSpPr>
+          <p:cNvPr id="27" name="PlaceHolder 2"/>
           <p:cNvSpPr>
             <a:spLocks noGrp="1"/>
           </p:cNvSpPr>
@@ -225,18 +215,15 @@
             <a:normAutofit/>
           </a:bodyPr>
           <a:p>
-            <a:endParaRPr b="0" lang="en-GB" sz="1050" spc="-1" strike="noStrike">
-              <a:solidFill>
-                <a:srgbClr val="000000"/>
-              </a:solidFill>
-              <a:latin typeface="Arial"/>
-            </a:endParaRPr>
-          </a:p>
-        </p:txBody>
-      </p:sp>
-      <p:sp>
-        <p:nvSpPr>
-          <p:cNvPr id="30" name="PlaceHolder 3"/>
+            <a:endParaRPr b="0" lang="en-GB" sz="3200" spc="-1" strike="noStrike">
+              <a:latin typeface="Arial"/>
+            </a:endParaRPr>
+          </a:p>
+        </p:txBody>
+      </p:sp>
+      <p:sp>
+        <p:nvSpPr>
+          <p:cNvPr id="28" name="PlaceHolder 3"/>
           <p:cNvSpPr>
             <a:spLocks noGrp="1"/>
           </p:cNvSpPr>
@@ -258,18 +245,15 @@
             <a:normAutofit/>
           </a:bodyPr>
           <a:p>
-            <a:endParaRPr b="0" lang="en-GB" sz="1050" spc="-1" strike="noStrike">
-              <a:solidFill>
-                <a:srgbClr val="000000"/>
-              </a:solidFill>
-              <a:latin typeface="Arial"/>
-            </a:endParaRPr>
-          </a:p>
-        </p:txBody>
-      </p:sp>
-      <p:sp>
-        <p:nvSpPr>
-          <p:cNvPr id="31" name="PlaceHolder 4"/>
+            <a:endParaRPr b="0" lang="en-GB" sz="3200" spc="-1" strike="noStrike">
+              <a:latin typeface="Arial"/>
+            </a:endParaRPr>
+          </a:p>
+        </p:txBody>
+      </p:sp>
+      <p:sp>
+        <p:nvSpPr>
+          <p:cNvPr id="29" name="PlaceHolder 4"/>
           <p:cNvSpPr>
             <a:spLocks noGrp="1"/>
           </p:cNvSpPr>
@@ -291,18 +275,15 @@
             <a:normAutofit/>
           </a:bodyPr>
           <a:p>
-            <a:endParaRPr b="0" lang="en-GB" sz="1050" spc="-1" strike="noStrike">
-              <a:solidFill>
-                <a:srgbClr val="000000"/>
-              </a:solidFill>
-              <a:latin typeface="Arial"/>
-            </a:endParaRPr>
-          </a:p>
-        </p:txBody>
-      </p:sp>
-      <p:sp>
-        <p:nvSpPr>
-          <p:cNvPr id="32" name="PlaceHolder 5"/>
+            <a:endParaRPr b="0" lang="en-GB" sz="3200" spc="-1" strike="noStrike">
+              <a:latin typeface="Arial"/>
+            </a:endParaRPr>
+          </a:p>
+        </p:txBody>
+      </p:sp>
+      <p:sp>
+        <p:nvSpPr>
+          <p:cNvPr id="30" name="PlaceHolder 5"/>
           <p:cNvSpPr>
             <a:spLocks noGrp="1"/>
           </p:cNvSpPr>
@@ -324,10 +305,7 @@
             <a:normAutofit/>
           </a:bodyPr>
           <a:p>
-            <a:endParaRPr b="0" lang="en-GB" sz="1050" spc="-1" strike="noStrike">
-              <a:solidFill>
-                <a:srgbClr val="000000"/>
-              </a:solidFill>
+            <a:endParaRPr b="0" lang="en-GB" sz="3200" spc="-1" strike="noStrike">
               <a:latin typeface="Arial"/>
             </a:endParaRPr>
           </a:p>
@@ -357,7 +335,7 @@
       </p:grpSpPr>
       <p:sp>
         <p:nvSpPr>
-          <p:cNvPr id="33" name="PlaceHolder 1"/>
+          <p:cNvPr id="31" name="PlaceHolder 1"/>
           <p:cNvSpPr>
             <a:spLocks noGrp="1"/>
           </p:cNvSpPr>
@@ -368,7 +346,7 @@
         <p:spPr>
           <a:xfrm>
             <a:off x="1143000" y="1122480"/>
-            <a:ext cx="6857640" cy="2387160"/>
+            <a:ext cx="6857280" cy="2386800"/>
           </a:xfrm>
           <a:prstGeom prst="rect">
             <a:avLst/>
@@ -377,18 +355,16 @@
         <p:txBody>
           <a:bodyPr lIns="0" rIns="0" tIns="0" bIns="0" anchor="ctr"/>
           <a:p>
-            <a:endParaRPr b="0" lang="en-GB" sz="1400" spc="-1" strike="noStrike">
-              <a:solidFill>
-                <a:srgbClr val="000000"/>
-              </a:solidFill>
-              <a:latin typeface="Arial"/>
-            </a:endParaRPr>
-          </a:p>
-        </p:txBody>
-      </p:sp>
-      <p:sp>
-        <p:nvSpPr>
-          <p:cNvPr id="34" name="PlaceHolder 2"/>
+            <a:pPr algn="ctr"/>
+            <a:endParaRPr b="0" lang="en-GB" sz="4400" spc="-1" strike="noStrike">
+              <a:latin typeface="Arial"/>
+            </a:endParaRPr>
+          </a:p>
+        </p:txBody>
+      </p:sp>
+      <p:sp>
+        <p:nvSpPr>
+          <p:cNvPr id="32" name="PlaceHolder 2"/>
           <p:cNvSpPr>
             <a:spLocks noGrp="1"/>
           </p:cNvSpPr>
@@ -410,18 +386,15 @@
             <a:normAutofit/>
           </a:bodyPr>
           <a:p>
-            <a:endParaRPr b="0" lang="en-GB" sz="1050" spc="-1" strike="noStrike">
-              <a:solidFill>
-                <a:srgbClr val="000000"/>
-              </a:solidFill>
-              <a:latin typeface="Arial"/>
-            </a:endParaRPr>
-          </a:p>
-        </p:txBody>
-      </p:sp>
-      <p:sp>
-        <p:nvSpPr>
-          <p:cNvPr id="35" name="PlaceHolder 3"/>
+            <a:endParaRPr b="0" lang="en-GB" sz="3200" spc="-1" strike="noStrike">
+              <a:latin typeface="Arial"/>
+            </a:endParaRPr>
+          </a:p>
+        </p:txBody>
+      </p:sp>
+      <p:sp>
+        <p:nvSpPr>
+          <p:cNvPr id="33" name="PlaceHolder 3"/>
           <p:cNvSpPr>
             <a:spLocks noGrp="1"/>
           </p:cNvSpPr>
@@ -443,18 +416,15 @@
             <a:normAutofit/>
           </a:bodyPr>
           <a:p>
-            <a:endParaRPr b="0" lang="en-GB" sz="1050" spc="-1" strike="noStrike">
-              <a:solidFill>
-                <a:srgbClr val="000000"/>
-              </a:solidFill>
-              <a:latin typeface="Arial"/>
-            </a:endParaRPr>
-          </a:p>
-        </p:txBody>
-      </p:sp>
-      <p:sp>
-        <p:nvSpPr>
-          <p:cNvPr id="36" name="PlaceHolder 4"/>
+            <a:endParaRPr b="0" lang="en-GB" sz="3200" spc="-1" strike="noStrike">
+              <a:latin typeface="Arial"/>
+            </a:endParaRPr>
+          </a:p>
+        </p:txBody>
+      </p:sp>
+      <p:sp>
+        <p:nvSpPr>
+          <p:cNvPr id="34" name="PlaceHolder 4"/>
           <p:cNvSpPr>
             <a:spLocks noGrp="1"/>
           </p:cNvSpPr>
@@ -476,18 +446,15 @@
             <a:normAutofit/>
           </a:bodyPr>
           <a:p>
-            <a:endParaRPr b="0" lang="en-GB" sz="1050" spc="-1" strike="noStrike">
-              <a:solidFill>
-                <a:srgbClr val="000000"/>
-              </a:solidFill>
-              <a:latin typeface="Arial"/>
-            </a:endParaRPr>
-          </a:p>
-        </p:txBody>
-      </p:sp>
-      <p:sp>
-        <p:nvSpPr>
-          <p:cNvPr id="37" name="PlaceHolder 5"/>
+            <a:endParaRPr b="0" lang="en-GB" sz="3200" spc="-1" strike="noStrike">
+              <a:latin typeface="Arial"/>
+            </a:endParaRPr>
+          </a:p>
+        </p:txBody>
+      </p:sp>
+      <p:sp>
+        <p:nvSpPr>
+          <p:cNvPr id="35" name="PlaceHolder 5"/>
           <p:cNvSpPr>
             <a:spLocks noGrp="1"/>
           </p:cNvSpPr>
@@ -509,18 +476,15 @@
             <a:normAutofit/>
           </a:bodyPr>
           <a:p>
-            <a:endParaRPr b="0" lang="en-GB" sz="1050" spc="-1" strike="noStrike">
-              <a:solidFill>
-                <a:srgbClr val="000000"/>
-              </a:solidFill>
-              <a:latin typeface="Arial"/>
-            </a:endParaRPr>
-          </a:p>
-        </p:txBody>
-      </p:sp>
-      <p:sp>
-        <p:nvSpPr>
-          <p:cNvPr id="38" name="PlaceHolder 6"/>
+            <a:endParaRPr b="0" lang="en-GB" sz="3200" spc="-1" strike="noStrike">
+              <a:latin typeface="Arial"/>
+            </a:endParaRPr>
+          </a:p>
+        </p:txBody>
+      </p:sp>
+      <p:sp>
+        <p:nvSpPr>
+          <p:cNvPr id="36" name="PlaceHolder 6"/>
           <p:cNvSpPr>
             <a:spLocks noGrp="1"/>
           </p:cNvSpPr>
@@ -542,18 +506,15 @@
             <a:normAutofit/>
           </a:bodyPr>
           <a:p>
-            <a:endParaRPr b="0" lang="en-GB" sz="1050" spc="-1" strike="noStrike">
-              <a:solidFill>
-                <a:srgbClr val="000000"/>
-              </a:solidFill>
-              <a:latin typeface="Arial"/>
-            </a:endParaRPr>
-          </a:p>
-        </p:txBody>
-      </p:sp>
-      <p:sp>
-        <p:nvSpPr>
-          <p:cNvPr id="39" name="PlaceHolder 7"/>
+            <a:endParaRPr b="0" lang="en-GB" sz="3200" spc="-1" strike="noStrike">
+              <a:latin typeface="Arial"/>
+            </a:endParaRPr>
+          </a:p>
+        </p:txBody>
+      </p:sp>
+      <p:sp>
+        <p:nvSpPr>
+          <p:cNvPr id="37" name="PlaceHolder 7"/>
           <p:cNvSpPr>
             <a:spLocks noGrp="1"/>
           </p:cNvSpPr>
@@ -575,10 +536,7 @@
             <a:normAutofit/>
           </a:bodyPr>
           <a:p>
-            <a:endParaRPr b="0" lang="en-GB" sz="1050" spc="-1" strike="noStrike">
-              <a:solidFill>
-                <a:srgbClr val="000000"/>
-              </a:solidFill>
+            <a:endParaRPr b="0" lang="en-GB" sz="3200" spc="-1" strike="noStrike">
               <a:latin typeface="Arial"/>
             </a:endParaRPr>
           </a:p>
@@ -608,7 +566,7 @@
       </p:grpSpPr>
       <p:sp>
         <p:nvSpPr>
-          <p:cNvPr id="4" name="PlaceHolder 1"/>
+          <p:cNvPr id="2" name="PlaceHolder 1"/>
           <p:cNvSpPr>
             <a:spLocks noGrp="1"/>
           </p:cNvSpPr>
@@ -619,7 +577,7 @@
         <p:spPr>
           <a:xfrm>
             <a:off x="1143000" y="1122480"/>
-            <a:ext cx="6857640" cy="2387160"/>
+            <a:ext cx="6857280" cy="2386800"/>
           </a:xfrm>
           <a:prstGeom prst="rect">
             <a:avLst/>
@@ -628,18 +586,16 @@
         <p:txBody>
           <a:bodyPr lIns="0" rIns="0" tIns="0" bIns="0" anchor="ctr"/>
           <a:p>
-            <a:endParaRPr b="0" lang="en-GB" sz="1400" spc="-1" strike="noStrike">
-              <a:solidFill>
-                <a:srgbClr val="000000"/>
-              </a:solidFill>
-              <a:latin typeface="Arial"/>
-            </a:endParaRPr>
-          </a:p>
-        </p:txBody>
-      </p:sp>
-      <p:sp>
-        <p:nvSpPr>
-          <p:cNvPr id="5" name="PlaceHolder 2"/>
+            <a:pPr algn="ctr"/>
+            <a:endParaRPr b="0" lang="en-GB" sz="4400" spc="-1" strike="noStrike">
+              <a:latin typeface="Arial"/>
+            </a:endParaRPr>
+          </a:p>
+        </p:txBody>
+      </p:sp>
+      <p:sp>
+        <p:nvSpPr>
+          <p:cNvPr id="3" name="PlaceHolder 2"/>
           <p:cNvSpPr>
             <a:spLocks noGrp="1"/>
           </p:cNvSpPr>
@@ -690,7 +646,7 @@
       </p:grpSpPr>
       <p:sp>
         <p:nvSpPr>
-          <p:cNvPr id="6" name="PlaceHolder 1"/>
+          <p:cNvPr id="4" name="PlaceHolder 1"/>
           <p:cNvSpPr>
             <a:spLocks noGrp="1"/>
           </p:cNvSpPr>
@@ -701,7 +657,7 @@
         <p:spPr>
           <a:xfrm>
             <a:off x="1143000" y="1122480"/>
-            <a:ext cx="6857640" cy="2387160"/>
+            <a:ext cx="6857280" cy="2386800"/>
           </a:xfrm>
           <a:prstGeom prst="rect">
             <a:avLst/>
@@ -710,18 +666,16 @@
         <p:txBody>
           <a:bodyPr lIns="0" rIns="0" tIns="0" bIns="0" anchor="ctr"/>
           <a:p>
-            <a:endParaRPr b="0" lang="en-GB" sz="1400" spc="-1" strike="noStrike">
-              <a:solidFill>
-                <a:srgbClr val="000000"/>
-              </a:solidFill>
-              <a:latin typeface="Arial"/>
-            </a:endParaRPr>
-          </a:p>
-        </p:txBody>
-      </p:sp>
-      <p:sp>
-        <p:nvSpPr>
-          <p:cNvPr id="7" name="PlaceHolder 2"/>
+            <a:pPr algn="ctr"/>
+            <a:endParaRPr b="0" lang="en-GB" sz="4400" spc="-1" strike="noStrike">
+              <a:latin typeface="Arial"/>
+            </a:endParaRPr>
+          </a:p>
+        </p:txBody>
+      </p:sp>
+      <p:sp>
+        <p:nvSpPr>
+          <p:cNvPr id="5" name="PlaceHolder 2"/>
           <p:cNvSpPr>
             <a:spLocks noGrp="1"/>
           </p:cNvSpPr>
@@ -743,10 +697,7 @@
             <a:normAutofit/>
           </a:bodyPr>
           <a:p>
-            <a:endParaRPr b="0" lang="en-GB" sz="1050" spc="-1" strike="noStrike">
-              <a:solidFill>
-                <a:srgbClr val="000000"/>
-              </a:solidFill>
+            <a:endParaRPr b="0" lang="en-GB" sz="3200" spc="-1" strike="noStrike">
               <a:latin typeface="Arial"/>
             </a:endParaRPr>
           </a:p>
@@ -776,7 +727,7 @@
       </p:grpSpPr>
       <p:sp>
         <p:nvSpPr>
-          <p:cNvPr id="8" name="PlaceHolder 1"/>
+          <p:cNvPr id="6" name="PlaceHolder 1"/>
           <p:cNvSpPr>
             <a:spLocks noGrp="1"/>
           </p:cNvSpPr>
@@ -787,7 +738,7 @@
         <p:spPr>
           <a:xfrm>
             <a:off x="1143000" y="1122480"/>
-            <a:ext cx="6857640" cy="2387160"/>
+            <a:ext cx="6857280" cy="2386800"/>
           </a:xfrm>
           <a:prstGeom prst="rect">
             <a:avLst/>
@@ -796,18 +747,16 @@
         <p:txBody>
           <a:bodyPr lIns="0" rIns="0" tIns="0" bIns="0" anchor="ctr"/>
           <a:p>
-            <a:endParaRPr b="0" lang="en-GB" sz="1400" spc="-1" strike="noStrike">
-              <a:solidFill>
-                <a:srgbClr val="000000"/>
-              </a:solidFill>
-              <a:latin typeface="Arial"/>
-            </a:endParaRPr>
-          </a:p>
-        </p:txBody>
-      </p:sp>
-      <p:sp>
-        <p:nvSpPr>
-          <p:cNvPr id="9" name="PlaceHolder 2"/>
+            <a:pPr algn="ctr"/>
+            <a:endParaRPr b="0" lang="en-GB" sz="4400" spc="-1" strike="noStrike">
+              <a:latin typeface="Arial"/>
+            </a:endParaRPr>
+          </a:p>
+        </p:txBody>
+      </p:sp>
+      <p:sp>
+        <p:nvSpPr>
+          <p:cNvPr id="7" name="PlaceHolder 2"/>
           <p:cNvSpPr>
             <a:spLocks noGrp="1"/>
           </p:cNvSpPr>
@@ -829,18 +778,15 @@
             <a:normAutofit/>
           </a:bodyPr>
           <a:p>
-            <a:endParaRPr b="0" lang="en-GB" sz="1050" spc="-1" strike="noStrike">
-              <a:solidFill>
-                <a:srgbClr val="000000"/>
-              </a:solidFill>
-              <a:latin typeface="Arial"/>
-            </a:endParaRPr>
-          </a:p>
-        </p:txBody>
-      </p:sp>
-      <p:sp>
-        <p:nvSpPr>
-          <p:cNvPr id="10" name="PlaceHolder 3"/>
+            <a:endParaRPr b="0" lang="en-GB" sz="3200" spc="-1" strike="noStrike">
+              <a:latin typeface="Arial"/>
+            </a:endParaRPr>
+          </a:p>
+        </p:txBody>
+      </p:sp>
+      <p:sp>
+        <p:nvSpPr>
+          <p:cNvPr id="8" name="PlaceHolder 3"/>
           <p:cNvSpPr>
             <a:spLocks noGrp="1"/>
           </p:cNvSpPr>
@@ -862,10 +808,7 @@
             <a:normAutofit/>
           </a:bodyPr>
           <a:p>
-            <a:endParaRPr b="0" lang="en-GB" sz="1050" spc="-1" strike="noStrike">
-              <a:solidFill>
-                <a:srgbClr val="000000"/>
-              </a:solidFill>
+            <a:endParaRPr b="0" lang="en-GB" sz="3200" spc="-1" strike="noStrike">
               <a:latin typeface="Arial"/>
             </a:endParaRPr>
           </a:p>
@@ -895,7 +838,7 @@
       </p:grpSpPr>
       <p:sp>
         <p:nvSpPr>
-          <p:cNvPr id="11" name="PlaceHolder 1"/>
+          <p:cNvPr id="9" name="PlaceHolder 1"/>
           <p:cNvSpPr>
             <a:spLocks noGrp="1"/>
           </p:cNvSpPr>
@@ -906,7 +849,7 @@
         <p:spPr>
           <a:xfrm>
             <a:off x="1143000" y="1122480"/>
-            <a:ext cx="6857640" cy="2387160"/>
+            <a:ext cx="6857280" cy="2386800"/>
           </a:xfrm>
           <a:prstGeom prst="rect">
             <a:avLst/>
@@ -915,10 +858,8 @@
         <p:txBody>
           <a:bodyPr lIns="0" rIns="0" tIns="0" bIns="0" anchor="ctr"/>
           <a:p>
-            <a:endParaRPr b="0" lang="en-GB" sz="1400" spc="-1" strike="noStrike">
-              <a:solidFill>
-                <a:srgbClr val="000000"/>
-              </a:solidFill>
+            <a:pPr algn="ctr"/>
+            <a:endParaRPr b="0" lang="en-GB" sz="4400" spc="-1" strike="noStrike">
               <a:latin typeface="Arial"/>
             </a:endParaRPr>
           </a:p>
@@ -948,7 +889,7 @@
       </p:grpSpPr>
       <p:sp>
         <p:nvSpPr>
-          <p:cNvPr id="12" name="PlaceHolder 1"/>
+          <p:cNvPr id="10" name="PlaceHolder 1"/>
           <p:cNvSpPr>
             <a:spLocks noGrp="1"/>
           </p:cNvSpPr>
@@ -959,7 +900,7 @@
         <p:spPr>
           <a:xfrm>
             <a:off x="1143000" y="1122480"/>
-            <a:ext cx="6857640" cy="11066760"/>
+            <a:ext cx="6857280" cy="11064960"/>
           </a:xfrm>
           <a:prstGeom prst="rect">
             <a:avLst/>
@@ -999,7 +940,7 @@
       </p:grpSpPr>
       <p:sp>
         <p:nvSpPr>
-          <p:cNvPr id="13" name="PlaceHolder 1"/>
+          <p:cNvPr id="11" name="PlaceHolder 1"/>
           <p:cNvSpPr>
             <a:spLocks noGrp="1"/>
           </p:cNvSpPr>
@@ -1010,7 +951,7 @@
         <p:spPr>
           <a:xfrm>
             <a:off x="1143000" y="1122480"/>
-            <a:ext cx="6857640" cy="2387160"/>
+            <a:ext cx="6857280" cy="2386800"/>
           </a:xfrm>
           <a:prstGeom prst="rect">
             <a:avLst/>
@@ -1019,18 +960,16 @@
         <p:txBody>
           <a:bodyPr lIns="0" rIns="0" tIns="0" bIns="0" anchor="ctr"/>
           <a:p>
-            <a:endParaRPr b="0" lang="en-GB" sz="1400" spc="-1" strike="noStrike">
-              <a:solidFill>
-                <a:srgbClr val="000000"/>
-              </a:solidFill>
-              <a:latin typeface="Arial"/>
-            </a:endParaRPr>
-          </a:p>
-        </p:txBody>
-      </p:sp>
-      <p:sp>
-        <p:nvSpPr>
-          <p:cNvPr id="14" name="PlaceHolder 2"/>
+            <a:pPr algn="ctr"/>
+            <a:endParaRPr b="0" lang="en-GB" sz="4400" spc="-1" strike="noStrike">
+              <a:latin typeface="Arial"/>
+            </a:endParaRPr>
+          </a:p>
+        </p:txBody>
+      </p:sp>
+      <p:sp>
+        <p:nvSpPr>
+          <p:cNvPr id="12" name="PlaceHolder 2"/>
           <p:cNvSpPr>
             <a:spLocks noGrp="1"/>
           </p:cNvSpPr>
@@ -1052,18 +991,15 @@
             <a:normAutofit/>
           </a:bodyPr>
           <a:p>
-            <a:endParaRPr b="0" lang="en-GB" sz="1050" spc="-1" strike="noStrike">
-              <a:solidFill>
-                <a:srgbClr val="000000"/>
-              </a:solidFill>
-              <a:latin typeface="Arial"/>
-            </a:endParaRPr>
-          </a:p>
-        </p:txBody>
-      </p:sp>
-      <p:sp>
-        <p:nvSpPr>
-          <p:cNvPr id="15" name="PlaceHolder 3"/>
+            <a:endParaRPr b="0" lang="en-GB" sz="3200" spc="-1" strike="noStrike">
+              <a:latin typeface="Arial"/>
+            </a:endParaRPr>
+          </a:p>
+        </p:txBody>
+      </p:sp>
+      <p:sp>
+        <p:nvSpPr>
+          <p:cNvPr id="13" name="PlaceHolder 3"/>
           <p:cNvSpPr>
             <a:spLocks noGrp="1"/>
           </p:cNvSpPr>
@@ -1085,18 +1021,15 @@
             <a:normAutofit/>
           </a:bodyPr>
           <a:p>
-            <a:endParaRPr b="0" lang="en-GB" sz="1050" spc="-1" strike="noStrike">
-              <a:solidFill>
-                <a:srgbClr val="000000"/>
-              </a:solidFill>
-              <a:latin typeface="Arial"/>
-            </a:endParaRPr>
-          </a:p>
-        </p:txBody>
-      </p:sp>
-      <p:sp>
-        <p:nvSpPr>
-          <p:cNvPr id="16" name="PlaceHolder 4"/>
+            <a:endParaRPr b="0" lang="en-GB" sz="3200" spc="-1" strike="noStrike">
+              <a:latin typeface="Arial"/>
+            </a:endParaRPr>
+          </a:p>
+        </p:txBody>
+      </p:sp>
+      <p:sp>
+        <p:nvSpPr>
+          <p:cNvPr id="14" name="PlaceHolder 4"/>
           <p:cNvSpPr>
             <a:spLocks noGrp="1"/>
           </p:cNvSpPr>
@@ -1118,10 +1051,7 @@
             <a:normAutofit/>
           </a:bodyPr>
           <a:p>
-            <a:endParaRPr b="0" lang="en-GB" sz="1050" spc="-1" strike="noStrike">
-              <a:solidFill>
-                <a:srgbClr val="000000"/>
-              </a:solidFill>
+            <a:endParaRPr b="0" lang="en-GB" sz="3200" spc="-1" strike="noStrike">
               <a:latin typeface="Arial"/>
             </a:endParaRPr>
           </a:p>
@@ -1151,7 +1081,7 @@
       </p:grpSpPr>
       <p:sp>
         <p:nvSpPr>
-          <p:cNvPr id="17" name="PlaceHolder 1"/>
+          <p:cNvPr id="15" name="PlaceHolder 1"/>
           <p:cNvSpPr>
             <a:spLocks noGrp="1"/>
           </p:cNvSpPr>
@@ -1162,7 +1092,7 @@
         <p:spPr>
           <a:xfrm>
             <a:off x="1143000" y="1122480"/>
-            <a:ext cx="6857640" cy="2387160"/>
+            <a:ext cx="6857280" cy="2386800"/>
           </a:xfrm>
           <a:prstGeom prst="rect">
             <a:avLst/>
@@ -1171,18 +1101,16 @@
         <p:txBody>
           <a:bodyPr lIns="0" rIns="0" tIns="0" bIns="0" anchor="ctr"/>
           <a:p>
-            <a:endParaRPr b="0" lang="en-GB" sz="1400" spc="-1" strike="noStrike">
-              <a:solidFill>
-                <a:srgbClr val="000000"/>
-              </a:solidFill>
-              <a:latin typeface="Arial"/>
-            </a:endParaRPr>
-          </a:p>
-        </p:txBody>
-      </p:sp>
-      <p:sp>
-        <p:nvSpPr>
-          <p:cNvPr id="18" name="PlaceHolder 2"/>
+            <a:pPr algn="ctr"/>
+            <a:endParaRPr b="0" lang="en-GB" sz="4400" spc="-1" strike="noStrike">
+              <a:latin typeface="Arial"/>
+            </a:endParaRPr>
+          </a:p>
+        </p:txBody>
+      </p:sp>
+      <p:sp>
+        <p:nvSpPr>
+          <p:cNvPr id="16" name="PlaceHolder 2"/>
           <p:cNvSpPr>
             <a:spLocks noGrp="1"/>
           </p:cNvSpPr>
@@ -1204,18 +1132,15 @@
             <a:normAutofit/>
           </a:bodyPr>
           <a:p>
-            <a:endParaRPr b="0" lang="en-GB" sz="1050" spc="-1" strike="noStrike">
-              <a:solidFill>
-                <a:srgbClr val="000000"/>
-              </a:solidFill>
-              <a:latin typeface="Arial"/>
-            </a:endParaRPr>
-          </a:p>
-        </p:txBody>
-      </p:sp>
-      <p:sp>
-        <p:nvSpPr>
-          <p:cNvPr id="19" name="PlaceHolder 3"/>
+            <a:endParaRPr b="0" lang="en-GB" sz="3200" spc="-1" strike="noStrike">
+              <a:latin typeface="Arial"/>
+            </a:endParaRPr>
+          </a:p>
+        </p:txBody>
+      </p:sp>
+      <p:sp>
+        <p:nvSpPr>
+          <p:cNvPr id="17" name="PlaceHolder 3"/>
           <p:cNvSpPr>
             <a:spLocks noGrp="1"/>
           </p:cNvSpPr>
@@ -1237,18 +1162,15 @@
             <a:normAutofit/>
           </a:bodyPr>
           <a:p>
-            <a:endParaRPr b="0" lang="en-GB" sz="1050" spc="-1" strike="noStrike">
-              <a:solidFill>
-                <a:srgbClr val="000000"/>
-              </a:solidFill>
-              <a:latin typeface="Arial"/>
-            </a:endParaRPr>
-          </a:p>
-        </p:txBody>
-      </p:sp>
-      <p:sp>
-        <p:nvSpPr>
-          <p:cNvPr id="20" name="PlaceHolder 4"/>
+            <a:endParaRPr b="0" lang="en-GB" sz="3200" spc="-1" strike="noStrike">
+              <a:latin typeface="Arial"/>
+            </a:endParaRPr>
+          </a:p>
+        </p:txBody>
+      </p:sp>
+      <p:sp>
+        <p:nvSpPr>
+          <p:cNvPr id="18" name="PlaceHolder 4"/>
           <p:cNvSpPr>
             <a:spLocks noGrp="1"/>
           </p:cNvSpPr>
@@ -1270,10 +1192,7 @@
             <a:normAutofit/>
           </a:bodyPr>
           <a:p>
-            <a:endParaRPr b="0" lang="en-GB" sz="1050" spc="-1" strike="noStrike">
-              <a:solidFill>
-                <a:srgbClr val="000000"/>
-              </a:solidFill>
+            <a:endParaRPr b="0" lang="en-GB" sz="3200" spc="-1" strike="noStrike">
               <a:latin typeface="Arial"/>
             </a:endParaRPr>
           </a:p>
@@ -1303,7 +1222,7 @@
       </p:grpSpPr>
       <p:sp>
         <p:nvSpPr>
-          <p:cNvPr id="21" name="PlaceHolder 1"/>
+          <p:cNvPr id="19" name="PlaceHolder 1"/>
           <p:cNvSpPr>
             <a:spLocks noGrp="1"/>
           </p:cNvSpPr>
@@ -1314,7 +1233,7 @@
         <p:spPr>
           <a:xfrm>
             <a:off x="1143000" y="1122480"/>
-            <a:ext cx="6857640" cy="2387160"/>
+            <a:ext cx="6857280" cy="2386800"/>
           </a:xfrm>
           <a:prstGeom prst="rect">
             <a:avLst/>
@@ -1323,18 +1242,16 @@
         <p:txBody>
           <a:bodyPr lIns="0" rIns="0" tIns="0" bIns="0" anchor="ctr"/>
           <a:p>
-            <a:endParaRPr b="0" lang="en-GB" sz="1400" spc="-1" strike="noStrike">
-              <a:solidFill>
-                <a:srgbClr val="000000"/>
-              </a:solidFill>
-              <a:latin typeface="Arial"/>
-            </a:endParaRPr>
-          </a:p>
-        </p:txBody>
-      </p:sp>
-      <p:sp>
-        <p:nvSpPr>
-          <p:cNvPr id="22" name="PlaceHolder 2"/>
+            <a:pPr algn="ctr"/>
+            <a:endParaRPr b="0" lang="en-GB" sz="4400" spc="-1" strike="noStrike">
+              <a:latin typeface="Arial"/>
+            </a:endParaRPr>
+          </a:p>
+        </p:txBody>
+      </p:sp>
+      <p:sp>
+        <p:nvSpPr>
+          <p:cNvPr id="20" name="PlaceHolder 2"/>
           <p:cNvSpPr>
             <a:spLocks noGrp="1"/>
           </p:cNvSpPr>
@@ -1356,18 +1273,15 @@
             <a:normAutofit/>
           </a:bodyPr>
           <a:p>
-            <a:endParaRPr b="0" lang="en-GB" sz="1050" spc="-1" strike="noStrike">
-              <a:solidFill>
-                <a:srgbClr val="000000"/>
-              </a:solidFill>
-              <a:latin typeface="Arial"/>
-            </a:endParaRPr>
-          </a:p>
-        </p:txBody>
-      </p:sp>
-      <p:sp>
-        <p:nvSpPr>
-          <p:cNvPr id="23" name="PlaceHolder 3"/>
+            <a:endParaRPr b="0" lang="en-GB" sz="3200" spc="-1" strike="noStrike">
+              <a:latin typeface="Arial"/>
+            </a:endParaRPr>
+          </a:p>
+        </p:txBody>
+      </p:sp>
+      <p:sp>
+        <p:nvSpPr>
+          <p:cNvPr id="21" name="PlaceHolder 3"/>
           <p:cNvSpPr>
             <a:spLocks noGrp="1"/>
           </p:cNvSpPr>
@@ -1389,18 +1303,15 @@
             <a:normAutofit/>
           </a:bodyPr>
           <a:p>
-            <a:endParaRPr b="0" lang="en-GB" sz="1050" spc="-1" strike="noStrike">
-              <a:solidFill>
-                <a:srgbClr val="000000"/>
-              </a:solidFill>
-              <a:latin typeface="Arial"/>
-            </a:endParaRPr>
-          </a:p>
-        </p:txBody>
-      </p:sp>
-      <p:sp>
-        <p:nvSpPr>
-          <p:cNvPr id="24" name="PlaceHolder 4"/>
+            <a:endParaRPr b="0" lang="en-GB" sz="3200" spc="-1" strike="noStrike">
+              <a:latin typeface="Arial"/>
+            </a:endParaRPr>
+          </a:p>
+        </p:txBody>
+      </p:sp>
+      <p:sp>
+        <p:nvSpPr>
+          <p:cNvPr id="22" name="PlaceHolder 4"/>
           <p:cNvSpPr>
             <a:spLocks noGrp="1"/>
           </p:cNvSpPr>
@@ -1422,10 +1333,7 @@
             <a:normAutofit/>
           </a:bodyPr>
           <a:p>
-            <a:endParaRPr b="0" lang="en-GB" sz="1050" spc="-1" strike="noStrike">
-              <a:solidFill>
-                <a:srgbClr val="000000"/>
-              </a:solidFill>
+            <a:endParaRPr b="0" lang="en-GB" sz="3200" spc="-1" strike="noStrike">
               <a:latin typeface="Arial"/>
             </a:endParaRPr>
           </a:p>
@@ -1473,128 +1381,202 @@
         <p:spPr>
           <a:xfrm>
             <a:off x="1143000" y="1122480"/>
-            <a:ext cx="6857640" cy="2387160"/>
-          </a:xfrm>
-          <a:prstGeom prst="rect">
-            <a:avLst/>
-          </a:prstGeom>
-        </p:spPr>
-        <p:txBody>
-          <a:bodyPr tIns="91440" bIns="91440" anchor="b"/>
+            <a:ext cx="6857280" cy="2386800"/>
+          </a:xfrm>
+          <a:prstGeom prst="rect">
+            <a:avLst/>
+          </a:prstGeom>
+        </p:spPr>
+        <p:txBody>
+          <a:bodyPr lIns="0" rIns="0" tIns="0" bIns="0" anchor="ctr"/>
           <a:p>
             <a:r>
-              <a:rPr b="0" lang="en-GB" sz="4500" spc="-1" strike="noStrike">
-                <a:solidFill>
-                  <a:srgbClr val="000000"/>
-                </a:solidFill>
+              <a:rPr b="0" lang="en-GB" sz="1800" spc="-1" strike="noStrike">
                 <a:latin typeface="Arial"/>
               </a:rPr>
               <a:t>Click to edit the title text format</a:t>
             </a:r>
-            <a:endParaRPr b="0" lang="en-GB" sz="4500" spc="-1" strike="noStrike">
-              <a:solidFill>
+            <a:endParaRPr b="0" lang="en-GB" sz="1800" spc="-1" strike="noStrike">
+              <a:latin typeface="Arial"/>
+            </a:endParaRPr>
+          </a:p>
+        </p:txBody>
+      </p:sp>
+      <p:sp>
+        <p:nvSpPr>
+          <p:cNvPr id="1" name="PlaceHolder 2"/>
+          <p:cNvSpPr>
+            <a:spLocks noGrp="1"/>
+          </p:cNvSpPr>
+          <p:nvPr>
+            <p:ph type="body"/>
+          </p:nvPr>
+        </p:nvSpPr>
+        <p:spPr>
+          <a:xfrm>
+            <a:off x="457200" y="1604520"/>
+            <a:ext cx="8229240" cy="3977280"/>
+          </a:xfrm>
+          <a:prstGeom prst="rect">
+            <a:avLst/>
+          </a:prstGeom>
+        </p:spPr>
+        <p:txBody>
+          <a:bodyPr lIns="0" rIns="0" tIns="0" bIns="0">
+            <a:normAutofit/>
+          </a:bodyPr>
+          <a:p>
+            <a:pPr marL="432000" indent="-324000">
+              <a:spcBef>
+                <a:spcPts val="1417"/>
+              </a:spcBef>
+              <a:buClr>
                 <a:srgbClr val="000000"/>
-              </a:solidFill>
-              <a:latin typeface="Arial"/>
-            </a:endParaRPr>
-          </a:p>
-        </p:txBody>
-      </p:sp>
-      <p:sp>
-        <p:nvSpPr>
-          <p:cNvPr id="1" name="PlaceHolder 2"/>
-          <p:cNvSpPr>
-            <a:spLocks noGrp="1"/>
-          </p:cNvSpPr>
-          <p:nvPr>
-            <p:ph type="dt"/>
-          </p:nvPr>
-        </p:nvSpPr>
-        <p:spPr>
-          <a:xfrm>
-            <a:off x="628560" y="6356520"/>
-            <a:ext cx="2057040" cy="364680"/>
-          </a:xfrm>
-          <a:prstGeom prst="rect">
-            <a:avLst/>
-          </a:prstGeom>
-        </p:spPr>
-        <p:txBody>
-          <a:bodyPr tIns="91440" bIns="91440" anchor="ctr"/>
-          <a:p>
+              </a:buClr>
+              <a:buSzPct val="45000"/>
+              <a:buFont typeface="Wingdings" charset="2"/>
+              <a:buChar char=""/>
+            </a:pPr>
+            <a:r>
+              <a:rPr b="0" lang="en-GB" sz="3200" spc="-1" strike="noStrike">
+                <a:latin typeface="Arial"/>
+              </a:rPr>
+              <a:t>Click to edit the outline text format</a:t>
+            </a:r>
+            <a:endParaRPr b="0" lang="en-GB" sz="3200" spc="-1" strike="noStrike">
+              <a:latin typeface="Arial"/>
+            </a:endParaRPr>
+          </a:p>
+          <a:p>
+            <a:pPr lvl="1" marL="864000" indent="-324000">
+              <a:spcBef>
+                <a:spcPts val="1134"/>
+              </a:spcBef>
+              <a:buClr>
+                <a:srgbClr val="000000"/>
+              </a:buClr>
+              <a:buSzPct val="75000"/>
+              <a:buFont typeface="Symbol" charset="2"/>
+              <a:buChar char=""/>
+            </a:pPr>
+            <a:r>
+              <a:rPr b="0" lang="en-GB" sz="2800" spc="-1" strike="noStrike">
+                <a:latin typeface="Arial"/>
+              </a:rPr>
+              <a:t>Second Outline Level</a:t>
+            </a:r>
+            <a:endParaRPr b="0" lang="en-GB" sz="2800" spc="-1" strike="noStrike">
+              <a:latin typeface="Arial"/>
+            </a:endParaRPr>
+          </a:p>
+          <a:p>
+            <a:pPr lvl="2" marL="1296000" indent="-288000">
+              <a:spcBef>
+                <a:spcPts val="850"/>
+              </a:spcBef>
+              <a:buClr>
+                <a:srgbClr val="000000"/>
+              </a:buClr>
+              <a:buSzPct val="45000"/>
+              <a:buFont typeface="Wingdings" charset="2"/>
+              <a:buChar char=""/>
+            </a:pPr>
+            <a:r>
+              <a:rPr b="0" lang="en-GB" sz="2400" spc="-1" strike="noStrike">
+                <a:latin typeface="Arial"/>
+              </a:rPr>
+              <a:t>Third Outline Level</a:t>
+            </a:r>
             <a:endParaRPr b="0" lang="en-GB" sz="2400" spc="-1" strike="noStrike">
-              <a:latin typeface="Times New Roman"/>
-            </a:endParaRPr>
-          </a:p>
-        </p:txBody>
-      </p:sp>
-      <p:sp>
-        <p:nvSpPr>
-          <p:cNvPr id="2" name="PlaceHolder 3"/>
-          <p:cNvSpPr>
-            <a:spLocks noGrp="1"/>
-          </p:cNvSpPr>
-          <p:nvPr>
-            <p:ph type="ftr"/>
-          </p:nvPr>
-        </p:nvSpPr>
-        <p:spPr>
-          <a:xfrm>
-            <a:off x="3029040" y="6356520"/>
-            <a:ext cx="3085920" cy="364680"/>
-          </a:xfrm>
-          <a:prstGeom prst="rect">
-            <a:avLst/>
-          </a:prstGeom>
-        </p:spPr>
-        <p:txBody>
-          <a:bodyPr tIns="91440" bIns="91440" anchor="ctr"/>
-          <a:p>
-            <a:endParaRPr b="0" lang="en-GB" sz="2400" spc="-1" strike="noStrike">
-              <a:latin typeface="Times New Roman"/>
-            </a:endParaRPr>
-          </a:p>
-        </p:txBody>
-      </p:sp>
-      <p:sp>
-        <p:nvSpPr>
-          <p:cNvPr id="3" name="PlaceHolder 4"/>
-          <p:cNvSpPr>
-            <a:spLocks noGrp="1"/>
-          </p:cNvSpPr>
-          <p:nvPr>
-            <p:ph type="sldNum"/>
-          </p:nvPr>
-        </p:nvSpPr>
-        <p:spPr>
-          <a:xfrm>
-            <a:off x="6458040" y="6356520"/>
-            <a:ext cx="2057040" cy="364680"/>
-          </a:xfrm>
-          <a:prstGeom prst="rect">
-            <a:avLst/>
-          </a:prstGeom>
-        </p:spPr>
-        <p:txBody>
-          <a:bodyPr anchor="ctr"/>
-          <a:p>
-            <a:pPr algn="r">
-              <a:lnSpc>
-                <a:spcPct val="100000"/>
-              </a:lnSpc>
+              <a:latin typeface="Arial"/>
+            </a:endParaRPr>
+          </a:p>
+          <a:p>
+            <a:pPr lvl="3" marL="1728000" indent="-216000">
+              <a:spcBef>
+                <a:spcPts val="567"/>
+              </a:spcBef>
+              <a:buClr>
+                <a:srgbClr val="000000"/>
+              </a:buClr>
+              <a:buSzPct val="75000"/>
+              <a:buFont typeface="Symbol" charset="2"/>
+              <a:buChar char=""/>
             </a:pPr>
-            <a:fld id="{8A912A00-3C77-429C-8B74-2D6EF76307C6}" type="slidenum">
-              <a:rPr b="0" lang="en-GB" sz="900" spc="-1" strike="noStrike">
-                <a:solidFill>
-                  <a:srgbClr val="888888"/>
-                </a:solidFill>
-                <a:latin typeface="Calibri"/>
-                <a:ea typeface="Calibri"/>
+            <a:r>
+              <a:rPr b="0" lang="en-GB" sz="2000" spc="-1" strike="noStrike">
+                <a:latin typeface="Arial"/>
               </a:rPr>
-              <a:t>&lt;number&gt;</a:t>
-            </a:fld>
-            <a:endParaRPr b="0" lang="en-GB" sz="900" spc="-1" strike="noStrike">
-              <a:latin typeface="Times New Roman"/>
+              <a:t>Fourth Outline Level</a:t>
+            </a:r>
+            <a:endParaRPr b="0" lang="en-GB" sz="2000" spc="-1" strike="noStrike">
+              <a:latin typeface="Arial"/>
+            </a:endParaRPr>
+          </a:p>
+          <a:p>
+            <a:pPr lvl="4" marL="2160000" indent="-216000">
+              <a:spcBef>
+                <a:spcPts val="283"/>
+              </a:spcBef>
+              <a:buClr>
+                <a:srgbClr val="000000"/>
+              </a:buClr>
+              <a:buSzPct val="45000"/>
+              <a:buFont typeface="Wingdings" charset="2"/>
+              <a:buChar char=""/>
+            </a:pPr>
+            <a:r>
+              <a:rPr b="0" lang="en-GB" sz="2000" spc="-1" strike="noStrike">
+                <a:latin typeface="Arial"/>
+              </a:rPr>
+              <a:t>Fifth Outline Level</a:t>
+            </a:r>
+            <a:endParaRPr b="0" lang="en-GB" sz="2000" spc="-1" strike="noStrike">
+              <a:latin typeface="Arial"/>
+            </a:endParaRPr>
+          </a:p>
+          <a:p>
+            <a:pPr lvl="5" marL="2592000" indent="-216000">
+              <a:spcBef>
+                <a:spcPts val="283"/>
+              </a:spcBef>
+              <a:buClr>
+                <a:srgbClr val="000000"/>
+              </a:buClr>
+              <a:buSzPct val="45000"/>
+              <a:buFont typeface="Wingdings" charset="2"/>
+              <a:buChar char=""/>
+            </a:pPr>
+            <a:r>
+              <a:rPr b="0" lang="en-GB" sz="2000" spc="-1" strike="noStrike">
+                <a:latin typeface="Arial"/>
+              </a:rPr>
+              <a:t>Sixth Outline Level</a:t>
+            </a:r>
+            <a:endParaRPr b="0" lang="en-GB" sz="2000" spc="-1" strike="noStrike">
+              <a:latin typeface="Arial"/>
+            </a:endParaRPr>
+          </a:p>
+          <a:p>
+            <a:pPr lvl="6" marL="3024000" indent="-216000">
+              <a:spcBef>
+                <a:spcPts val="283"/>
+              </a:spcBef>
+              <a:buClr>
+                <a:srgbClr val="000000"/>
+              </a:buClr>
+              <a:buSzPct val="45000"/>
+              <a:buFont typeface="Wingdings" charset="2"/>
+              <a:buChar char=""/>
+            </a:pPr>
+            <a:r>
+              <a:rPr b="0" lang="en-GB" sz="2000" spc="-1" strike="noStrike">
+                <a:latin typeface="Arial"/>
+              </a:rPr>
+              <a:t>Seventh Outline Level</a:t>
+            </a:r>
+            <a:endParaRPr b="0" lang="en-GB" sz="2000" spc="-1" strike="noStrike">
+              <a:latin typeface="Arial"/>
             </a:endParaRPr>
           </a:p>
         </p:txBody>
@@ -1638,7 +1620,7 @@
       </p:grpSpPr>
       <p:pic>
         <p:nvPicPr>
-          <p:cNvPr id="40" name="Google Shape;88;p13" descr=""/>
+          <p:cNvPr id="38" name="Google Shape;88;p13" descr=""/>
           <p:cNvPicPr/>
           <p:nvPr/>
         </p:nvPicPr>
@@ -1650,7 +1632,7 @@
         <p:spPr>
           <a:xfrm>
             <a:off x="0" y="3764880"/>
-            <a:ext cx="9143640" cy="3092760"/>
+            <a:ext cx="9143280" cy="3092400"/>
           </a:xfrm>
           <a:prstGeom prst="rect">
             <a:avLst/>
@@ -1662,14 +1644,14 @@
       </p:pic>
       <p:sp>
         <p:nvSpPr>
-          <p:cNvPr id="41" name="TextShape 1"/>
-          <p:cNvSpPr txBox="1"/>
+          <p:cNvPr id="39" name="CustomShape 1"/>
+          <p:cNvSpPr/>
           <p:nvPr/>
         </p:nvSpPr>
         <p:spPr>
           <a:xfrm>
             <a:off x="0" y="1683720"/>
-            <a:ext cx="9143640" cy="1469160"/>
+            <a:ext cx="9143280" cy="1468800"/>
           </a:xfrm>
           <a:prstGeom prst="rect">
             <a:avLst/>
@@ -1679,6 +1661,12 @@
             <a:noFill/>
           </a:ln>
         </p:spPr>
+        <p:style>
+          <a:lnRef idx="0"/>
+          <a:fillRef idx="0"/>
+          <a:effectRef idx="0"/>
+          <a:fontRef idx="minor"/>
+        </p:style>
         <p:txBody>
           <a:bodyPr lIns="68400" rIns="68400" tIns="34200" bIns="34200" anchor="ctr"/>
           <a:p>
@@ -1709,24 +1697,21 @@
               <a:t>plant species richness &amp; turnover</a:t>
             </a:r>
             <a:endParaRPr b="0" lang="en-GB" sz="4000" spc="-1" strike="noStrike">
-              <a:solidFill>
-                <a:srgbClr val="000000"/>
-              </a:solidFill>
-              <a:latin typeface="Arial"/>
-            </a:endParaRPr>
-          </a:p>
-        </p:txBody>
-      </p:sp>
-      <p:sp>
-        <p:nvSpPr>
-          <p:cNvPr id="42" name="CustomShape 2"/>
+              <a:latin typeface="Arial"/>
+            </a:endParaRPr>
+          </a:p>
+        </p:txBody>
+      </p:sp>
+      <p:sp>
+        <p:nvSpPr>
+          <p:cNvPr id="40" name="CustomShape 2"/>
           <p:cNvSpPr/>
           <p:nvPr/>
         </p:nvSpPr>
         <p:spPr>
           <a:xfrm>
             <a:off x="2343240" y="4212000"/>
-            <a:ext cx="4457520" cy="949320"/>
+            <a:ext cx="4457160" cy="948960"/>
           </a:xfrm>
           <a:prstGeom prst="rect">
             <a:avLst/>
@@ -1788,21 +1773,21 @@
       </p:sp>
       <p:grpSp>
         <p:nvGrpSpPr>
-          <p:cNvPr id="43" name="Group 3"/>
+          <p:cNvPr id="41" name="Group 3"/>
           <p:cNvGrpSpPr/>
           <p:nvPr/>
         </p:nvGrpSpPr>
         <p:grpSpPr>
           <a:xfrm>
             <a:off x="229320" y="361800"/>
-            <a:ext cx="8776080" cy="892080"/>
+            <a:ext cx="8821080" cy="756000"/>
             <a:chOff x="229320" y="361800"/>
-            <a:chExt cx="8776080" cy="892080"/>
+            <a:chExt cx="8821080" cy="756000"/>
           </a:xfrm>
         </p:grpSpPr>
         <p:pic>
           <p:nvPicPr>
-            <p:cNvPr id="44" name="Google Shape;92;p13" descr=""/>
+            <p:cNvPr id="42" name="Google Shape;92;p13" descr=""/>
             <p:cNvPicPr/>
             <p:nvPr/>
           </p:nvPicPr>
@@ -1812,8 +1797,8 @@
           </p:blipFill>
           <p:spPr>
             <a:xfrm>
-              <a:off x="1226160" y="361800"/>
-              <a:ext cx="882000" cy="892080"/>
+              <a:off x="1073520" y="361800"/>
+              <a:ext cx="746280" cy="756000"/>
             </a:xfrm>
             <a:prstGeom prst="rect">
               <a:avLst/>
@@ -1825,7 +1810,7 @@
         </p:pic>
         <p:pic>
           <p:nvPicPr>
-            <p:cNvPr id="45" name="Google Shape;93;p13" descr=""/>
+            <p:cNvPr id="43" name="Google Shape;93;p13" descr=""/>
             <p:cNvPicPr/>
             <p:nvPr/>
           </p:nvPicPr>
@@ -1836,7 +1821,7 @@
           <p:spPr>
             <a:xfrm>
               <a:off x="229320" y="361800"/>
-              <a:ext cx="870120" cy="892080"/>
+              <a:ext cx="736560" cy="756000"/>
             </a:xfrm>
             <a:prstGeom prst="rect">
               <a:avLst/>
@@ -1848,7 +1833,7 @@
         </p:pic>
         <p:pic>
           <p:nvPicPr>
-            <p:cNvPr id="46" name="Google Shape;94;p13" descr=""/>
+            <p:cNvPr id="44" name="Google Shape;94;p13" descr=""/>
             <p:cNvPicPr/>
             <p:nvPr/>
           </p:nvPicPr>
@@ -1858,8 +1843,8 @@
           </p:blipFill>
           <p:spPr>
             <a:xfrm>
-              <a:off x="5866200" y="478080"/>
-              <a:ext cx="1858680" cy="651600"/>
+              <a:off x="6392520" y="432000"/>
+              <a:ext cx="1573200" cy="552240"/>
             </a:xfrm>
             <a:prstGeom prst="rect">
               <a:avLst/>
@@ -1871,7 +1856,7 @@
         </p:pic>
         <p:pic>
           <p:nvPicPr>
-            <p:cNvPr id="47" name="Google Shape;95;p13" descr=""/>
+            <p:cNvPr id="45" name="Google Shape;95;p13" descr=""/>
             <p:cNvPicPr/>
             <p:nvPr/>
           </p:nvPicPr>
@@ -1881,8 +1866,8 @@
           </p:blipFill>
           <p:spPr>
             <a:xfrm>
-              <a:off x="4608720" y="487080"/>
-              <a:ext cx="1126800" cy="642600"/>
+              <a:off x="5328000" y="439560"/>
+              <a:ext cx="954000" cy="544680"/>
             </a:xfrm>
             <a:prstGeom prst="rect">
               <a:avLst/>
@@ -1894,7 +1879,7 @@
         </p:pic>
         <p:pic>
           <p:nvPicPr>
-            <p:cNvPr id="48" name="Google Shape;96;p13" descr=""/>
+            <p:cNvPr id="46" name="Google Shape;96;p13" descr=""/>
             <p:cNvPicPr/>
             <p:nvPr/>
           </p:nvPicPr>
@@ -1904,8 +1889,8 @@
           </p:blipFill>
           <p:spPr>
             <a:xfrm>
-              <a:off x="7851600" y="481320"/>
-              <a:ext cx="1153800" cy="645120"/>
+              <a:off x="8073720" y="435240"/>
+              <a:ext cx="976680" cy="545760"/>
             </a:xfrm>
             <a:prstGeom prst="rect">
               <a:avLst/>
@@ -1918,14 +1903,14 @@
       </p:grpSp>
       <p:sp>
         <p:nvSpPr>
-          <p:cNvPr id="49" name="CustomShape 4"/>
+          <p:cNvPr id="47" name="CustomShape 4"/>
           <p:cNvSpPr/>
           <p:nvPr/>
         </p:nvSpPr>
         <p:spPr>
           <a:xfrm>
             <a:off x="3246840" y="6553440"/>
-            <a:ext cx="5896800" cy="304200"/>
+            <a:ext cx="5896440" cy="303840"/>
           </a:xfrm>
           <a:prstGeom prst="rect">
             <a:avLst/>
@@ -1967,14 +1952,14 @@
       </p:sp>
       <p:sp>
         <p:nvSpPr>
-          <p:cNvPr id="50" name="CustomShape 5"/>
+          <p:cNvPr id="48" name="CustomShape 5"/>
           <p:cNvSpPr/>
           <p:nvPr/>
         </p:nvSpPr>
         <p:spPr>
           <a:xfrm>
-            <a:off x="2355480" y="375120"/>
-            <a:ext cx="2005920" cy="892080"/>
+            <a:off x="2091240" y="288000"/>
+            <a:ext cx="2005560" cy="891720"/>
           </a:xfrm>
           <a:prstGeom prst="rect">
             <a:avLst/>
@@ -2056,7 +2041,7 @@
       </p:sp>
       <p:pic>
         <p:nvPicPr>
-          <p:cNvPr id="51" name="Google Shape;57;p13" descr=""/>
+          <p:cNvPr id="49" name="Google Shape;57;p13" descr=""/>
           <p:cNvPicPr/>
           <p:nvPr/>
         </p:nvPicPr>
@@ -2067,7 +2052,7 @@
         <p:spPr>
           <a:xfrm>
             <a:off x="5112000" y="3184200"/>
-            <a:ext cx="382680" cy="382680"/>
+            <a:ext cx="382320" cy="382320"/>
           </a:xfrm>
           <a:prstGeom prst="rect">
             <a:avLst/>
@@ -2079,14 +2064,14 @@
       </p:pic>
       <p:sp>
         <p:nvSpPr>
-          <p:cNvPr id="52" name="CustomShape 6"/>
+          <p:cNvPr id="50" name="CustomShape 6"/>
           <p:cNvSpPr/>
           <p:nvPr/>
         </p:nvSpPr>
         <p:spPr>
           <a:xfrm>
             <a:off x="5370120" y="3242160"/>
-            <a:ext cx="1188720" cy="252720"/>
+            <a:ext cx="1188360" cy="252360"/>
           </a:xfrm>
           <a:prstGeom prst="rect">
             <a:avLst/>
@@ -2128,14 +2113,14 @@
       </p:sp>
       <p:sp>
         <p:nvSpPr>
-          <p:cNvPr id="53" name="TextShape 7"/>
-          <p:cNvSpPr txBox="1"/>
+          <p:cNvPr id="51" name="CustomShape 7"/>
+          <p:cNvSpPr/>
           <p:nvPr/>
         </p:nvSpPr>
         <p:spPr>
           <a:xfrm>
             <a:off x="2304000" y="3096720"/>
-            <a:ext cx="2741040" cy="575280"/>
+            <a:ext cx="2740680" cy="574920"/>
           </a:xfrm>
           <a:prstGeom prst="rect">
             <a:avLst/>
@@ -2145,9 +2130,20 @@
             <a:noFill/>
           </a:ln>
         </p:spPr>
+        <p:style>
+          <a:lnRef idx="0"/>
+          <a:fillRef idx="0"/>
+          <a:effectRef idx="0"/>
+          <a:fontRef idx="minor"/>
+        </p:style>
         <p:txBody>
           <a:bodyPr lIns="90000" rIns="90000" tIns="45000" bIns="45000"/>
           <a:p>
+            <a:pPr>
+              <a:lnSpc>
+                <a:spcPct val="100000"/>
+              </a:lnSpc>
+            </a:pPr>
             <a:r>
               <a:rPr b="0" lang="en-GB" sz="2800" spc="-1" strike="noStrike">
                 <a:solidFill>
@@ -2164,6 +2160,29 @@
           </a:p>
         </p:txBody>
       </p:sp>
+      <p:pic>
+        <p:nvPicPr>
+          <p:cNvPr id="52" name="" descr=""/>
+          <p:cNvPicPr/>
+          <p:nvPr/>
+        </p:nvPicPr>
+        <p:blipFill>
+          <a:blip r:embed="rId8"/>
+          <a:stretch/>
+        </p:blipFill>
+        <p:spPr>
+          <a:xfrm>
+            <a:off x="4096800" y="288000"/>
+            <a:ext cx="1231200" cy="792000"/>
+          </a:xfrm>
+          <a:prstGeom prst="rect">
+            <a:avLst/>
+          </a:prstGeom>
+          <a:ln>
+            <a:noFill/>
+          </a:ln>
+        </p:spPr>
+      </p:pic>
     </p:spTree>
   </p:cSld>
   <mc:AlternateContent>

</xml_diff>